<commit_message>
Slides 65/67: Width/Height reversed fix.
</commit_message>
<xml_diff>
--- a/AdditionalMaterials/BookPPTs/Chap3.pptx
+++ b/AdditionalMaterials/BookPPTs/Chap3.pptx
@@ -602,7 +602,7 @@
           <a:p>
             <a:fld id="{0E6BA319-05E9-49EE-8F99-CA1240CA2757}" type="datetimeFigureOut">
               <a:rPr lang="en-US" smtClean="0"/>
-              <a:t>7/16/2017</a:t>
+              <a:t>3/25/2019</a:t>
             </a:fld>
             <a:endParaRPr lang="en-US"/>
           </a:p>
@@ -806,7 +806,7 @@
           <a:p>
             <a:fld id="{0E6BA319-05E9-49EE-8F99-CA1240CA2757}" type="datetimeFigureOut">
               <a:rPr lang="en-US" smtClean="0"/>
-              <a:t>7/16/2017</a:t>
+              <a:t>3/25/2019</a:t>
             </a:fld>
             <a:endParaRPr lang="en-US"/>
           </a:p>
@@ -1561,7 +1561,7 @@
           <a:p>
             <a:fld id="{0E6BA319-05E9-49EE-8F99-CA1240CA2757}" type="datetimeFigureOut">
               <a:rPr lang="en-US" smtClean="0"/>
-              <a:t>7/16/2017</a:t>
+              <a:t>3/25/2019</a:t>
             </a:fld>
             <a:endParaRPr lang="en-US"/>
           </a:p>
@@ -1817,7 +1817,7 @@
           <a:p>
             <a:fld id="{0E6BA319-05E9-49EE-8F99-CA1240CA2757}" type="datetimeFigureOut">
               <a:rPr lang="en-US" smtClean="0"/>
-              <a:t>7/16/2017</a:t>
+              <a:t>3/25/2019</a:t>
             </a:fld>
             <a:endParaRPr lang="en-US"/>
           </a:p>
@@ -2208,7 +2208,7 @@
           <a:p>
             <a:fld id="{0E6BA319-05E9-49EE-8F99-CA1240CA2757}" type="datetimeFigureOut">
               <a:rPr lang="en-US" smtClean="0"/>
-              <a:t>7/16/2017</a:t>
+              <a:t>3/25/2019</a:t>
             </a:fld>
             <a:endParaRPr lang="en-US"/>
           </a:p>
@@ -2350,7 +2350,7 @@
           <a:p>
             <a:fld id="{0E6BA319-05E9-49EE-8F99-CA1240CA2757}" type="datetimeFigureOut">
               <a:rPr lang="en-US" smtClean="0"/>
-              <a:t>7/16/2017</a:t>
+              <a:t>3/25/2019</a:t>
             </a:fld>
             <a:endParaRPr lang="en-US"/>
           </a:p>
@@ -2469,7 +2469,7 @@
           <a:p>
             <a:fld id="{0E6BA319-05E9-49EE-8F99-CA1240CA2757}" type="datetimeFigureOut">
               <a:rPr lang="en-US" smtClean="0"/>
-              <a:t>7/16/2017</a:t>
+              <a:t>3/25/2019</a:t>
             </a:fld>
             <a:endParaRPr lang="en-US"/>
           </a:p>
@@ -2770,7 +2770,7 @@
           <a:p>
             <a:fld id="{0E6BA319-05E9-49EE-8F99-CA1240CA2757}" type="datetimeFigureOut">
               <a:rPr lang="en-US" smtClean="0"/>
-              <a:t>7/16/2017</a:t>
+              <a:t>3/25/2019</a:t>
             </a:fld>
             <a:endParaRPr lang="en-US"/>
           </a:p>
@@ -3047,7 +3047,7 @@
           <a:p>
             <a:fld id="{0E6BA319-05E9-49EE-8F99-CA1240CA2757}" type="datetimeFigureOut">
               <a:rPr lang="en-US" smtClean="0"/>
-              <a:t>7/16/2017</a:t>
+              <a:t>3/25/2019</a:t>
             </a:fld>
             <a:endParaRPr lang="en-US"/>
           </a:p>
@@ -14835,7 +14835,15 @@
             </a:pPr>
             <a:r>
               <a:rPr lang="en-US" dirty="0"/>
-              <a:t>        -2,     // distance to left of WC</a:t>
+              <a:t>        </a:t>
+            </a:r>
+            <a:r>
+              <a:rPr lang="en-US" dirty="0" smtClean="0"/>
+              <a:t>-4,     </a:t>
+            </a:r>
+            <a:r>
+              <a:rPr lang="en-US" dirty="0"/>
+              <a:t>// distance to left of WC</a:t>
             </a:r>
           </a:p>
           <a:p>
@@ -14844,7 +14852,15 @@
             </a:pPr>
             <a:r>
               <a:rPr lang="en-US" dirty="0"/>
-              <a:t>         2,     // distance to right of WC</a:t>
+              <a:t>         </a:t>
+            </a:r>
+            <a:r>
+              <a:rPr lang="en-US" dirty="0" smtClean="0"/>
+              <a:t>4,     </a:t>
+            </a:r>
+            <a:r>
+              <a:rPr lang="en-US" dirty="0"/>
+              <a:t>// distance to right of WC</a:t>
             </a:r>
           </a:p>
           <a:p>
@@ -14853,7 +14869,15 @@
             </a:pPr>
             <a:r>
               <a:rPr lang="en-US" dirty="0"/>
-              <a:t>        -4,      // distance to bottom of WC</a:t>
+              <a:t>        </a:t>
+            </a:r>
+            <a:r>
+              <a:rPr lang="en-US" dirty="0" smtClean="0"/>
+              <a:t>-2,      </a:t>
+            </a:r>
+            <a:r>
+              <a:rPr lang="en-US" dirty="0"/>
+              <a:t>// distance to bottom of WC</a:t>
             </a:r>
           </a:p>
           <a:p>
@@ -14862,7 +14886,15 @@
             </a:pPr>
             <a:r>
               <a:rPr lang="en-US" dirty="0"/>
-              <a:t>         4,      // distance to top of WC</a:t>
+              <a:t>         </a:t>
+            </a:r>
+            <a:r>
+              <a:rPr lang="en-US" dirty="0" smtClean="0"/>
+              <a:t>2,      </a:t>
+            </a:r>
+            <a:r>
+              <a:rPr lang="en-US" dirty="0"/>
+              <a:t>// distance to top of WC</a:t>
             </a:r>
           </a:p>
           <a:p>
@@ -15153,18 +15185,39 @@
                   <a:schemeClr val="tx1"/>
                 </a:solidFill>
               </a:rPr>
-              <a:t>Visible width is: 4</a:t>
-            </a:r>
-          </a:p>
-          <a:p>
-            <a:pPr algn="ctr"/>
+              <a:t>Visible width is: </a:t>
+            </a:r>
             <a:r>
               <a:rPr lang="en-US" sz="2000" dirty="0" smtClean="0">
                 <a:solidFill>
                   <a:schemeClr val="tx1"/>
                 </a:solidFill>
               </a:rPr>
-              <a:t>Visible Height is: 8</a:t>
+              <a:t>8</a:t>
+            </a:r>
+            <a:endParaRPr lang="en-US" sz="2000" dirty="0" smtClean="0">
+              <a:solidFill>
+                <a:schemeClr val="tx1"/>
+              </a:solidFill>
+            </a:endParaRPr>
+          </a:p>
+          <a:p>
+            <a:pPr algn="ctr"/>
+            <a:r>
+              <a:rPr lang="en-US" sz="2000" dirty="0" smtClean="0">
+                <a:solidFill>
+                  <a:schemeClr val="tx1"/>
+                </a:solidFill>
+              </a:rPr>
+              <a:t>Visible Height is: </a:t>
+            </a:r>
+            <a:r>
+              <a:rPr lang="en-US" sz="2000" dirty="0" smtClean="0">
+                <a:solidFill>
+                  <a:schemeClr val="tx1"/>
+                </a:solidFill>
+              </a:rPr>
+              <a:t>4</a:t>
             </a:r>
             <a:endParaRPr lang="en-US" sz="2000" dirty="0">
               <a:solidFill>
@@ -15592,7 +15645,7 @@
             </a:r>
             <a:r>
               <a:rPr lang="en-US" dirty="0" smtClean="0"/>
-              <a:t>-1.1,     </a:t>
+              <a:t>-2.1,     </a:t>
             </a:r>
             <a:r>
               <a:rPr lang="en-US" dirty="0"/>
@@ -15609,7 +15662,11 @@
             </a:r>
             <a:r>
               <a:rPr lang="en-US" dirty="0" smtClean="0"/>
-              <a:t>1.1,     </a:t>
+              <a:t>2</a:t>
+            </a:r>
+            <a:r>
+              <a:rPr lang="en-US" dirty="0" smtClean="0"/>
+              <a:t>.1,     </a:t>
             </a:r>
             <a:r>
               <a:rPr lang="en-US" dirty="0"/>
@@ -15626,7 +15683,11 @@
             </a:r>
             <a:r>
               <a:rPr lang="en-US" dirty="0" smtClean="0"/>
-              <a:t>--2.1,      </a:t>
+              <a:t>-1.1</a:t>
+            </a:r>
+            <a:r>
+              <a:rPr lang="en-US" dirty="0" smtClean="0"/>
+              <a:t>,      </a:t>
             </a:r>
             <a:r>
               <a:rPr lang="en-US" dirty="0"/>
@@ -15642,8 +15703,16 @@
               <a:t>         </a:t>
             </a:r>
             <a:r>
-              <a:rPr lang="en-US" dirty="0" smtClean="0"/>
-              <a:t>2.1,      </a:t>
+              <a:rPr lang="en-US" dirty="0"/>
+              <a:t>1</a:t>
+            </a:r>
+            <a:r>
+              <a:rPr lang="en-US" dirty="0" smtClean="0"/>
+              <a:t>.1</a:t>
+            </a:r>
+            <a:r>
+              <a:rPr lang="en-US" dirty="0" smtClean="0"/>
+              <a:t>,      </a:t>
             </a:r>
             <a:r>
               <a:rPr lang="en-US" dirty="0"/>
@@ -15938,18 +16007,39 @@
                   <a:schemeClr val="tx1"/>
                 </a:solidFill>
               </a:rPr>
-              <a:t>Visible width is: 2.2</a:t>
-            </a:r>
-          </a:p>
-          <a:p>
-            <a:pPr algn="ctr"/>
+              <a:t>Visible width is: </a:t>
+            </a:r>
             <a:r>
               <a:rPr lang="en-US" sz="2000" dirty="0" smtClean="0">
                 <a:solidFill>
                   <a:schemeClr val="tx1"/>
                 </a:solidFill>
               </a:rPr>
-              <a:t>Visible Height is: 4.2</a:t>
+              <a:t>4.2</a:t>
+            </a:r>
+            <a:endParaRPr lang="en-US" sz="2000" dirty="0" smtClean="0">
+              <a:solidFill>
+                <a:schemeClr val="tx1"/>
+              </a:solidFill>
+            </a:endParaRPr>
+          </a:p>
+          <a:p>
+            <a:pPr algn="ctr"/>
+            <a:r>
+              <a:rPr lang="en-US" sz="2000" dirty="0" smtClean="0">
+                <a:solidFill>
+                  <a:schemeClr val="tx1"/>
+                </a:solidFill>
+              </a:rPr>
+              <a:t>Visible Height is: </a:t>
+            </a:r>
+            <a:r>
+              <a:rPr lang="en-US" sz="2000" dirty="0" smtClean="0">
+                <a:solidFill>
+                  <a:schemeClr val="tx1"/>
+                </a:solidFill>
+              </a:rPr>
+              <a:t>2.2</a:t>
             </a:r>
             <a:endParaRPr lang="en-US" sz="2000" dirty="0">
               <a:solidFill>

</xml_diff>